<commit_message>
Updated UI presentation of Login and Sign-up Pages
Updated UI presentation of Login and Sign-up Pages with more details on the notes below each UI picture.
</commit_message>
<xml_diff>
--- a/UI Templates/SparkyOnlineStore.pptx
+++ b/UI Templates/SparkyOnlineStore.pptx
@@ -8,10 +8,10 @@
     <p:notesMasterId r:id="rId6"/>
   </p:notesMasterIdLst>
   <p:sldIdLst>
-    <p:sldId id="256" r:id="rId2"/>
-    <p:sldId id="257" r:id="rId3"/>
-    <p:sldId id="258" r:id="rId4"/>
-    <p:sldId id="259" r:id="rId5"/>
+    <p:sldId id="260" r:id="rId2"/>
+    <p:sldId id="256" r:id="rId3"/>
+    <p:sldId id="257" r:id="rId4"/>
+    <p:sldId id="258" r:id="rId5"/>
   </p:sldIdLst>
   <p:sldSz cx="13716000" cy="11258550"/>
   <p:notesSz cx="11258550" cy="13716000"/>
@@ -309,6 +309,143 @@
           <a:bodyPr/>
           <a:lstStyle/>
           <a:p>
+            <a:r>
+              <a:rPr lang="en-US" dirty="0" smtClean="0"/>
+              <a:t>For a more </a:t>
+            </a:r>
+            <a:r>
+              <a:rPr lang="en-US" dirty="0" smtClean="0"/>
+              <a:t>engaging </a:t>
+            </a:r>
+            <a:r>
+              <a:rPr lang="en-US" dirty="0" smtClean="0"/>
+              <a:t>presentation of the UI, please follow the following link: https://pitchdeck.hypermatic.com/slides/lemk0e8h67792?token=WjBaJGhWam9fQF9tblA</a:t>
+            </a:r>
+            <a:r>
+              <a:rPr lang="en-US" dirty="0" smtClean="0"/>
+              <a:t>=</a:t>
+            </a:r>
+          </a:p>
+          <a:p>
+            <a:r>
+              <a:rPr lang="en-US" dirty="0" smtClean="0"/>
+              <a:t>Note</a:t>
+            </a:r>
+            <a:r>
+              <a:rPr lang="en-US" dirty="0" smtClean="0"/>
+              <a:t>: The animation in the </a:t>
+            </a:r>
+            <a:r>
+              <a:rPr lang="en-US" dirty="0" smtClean="0"/>
+              <a:t>presentation is to emphasize on the features</a:t>
+            </a:r>
+            <a:r>
+              <a:rPr lang="en-US" baseline="0" dirty="0" smtClean="0"/>
+              <a:t> each page has and the</a:t>
+            </a:r>
+            <a:r>
+              <a:rPr lang="en-US" dirty="0" smtClean="0"/>
+              <a:t> </a:t>
+            </a:r>
+            <a:r>
+              <a:rPr lang="en-US" dirty="0" smtClean="0"/>
+              <a:t>PowerPoint presentation is to </a:t>
+            </a:r>
+            <a:r>
+              <a:rPr lang="en-US" dirty="0" smtClean="0"/>
+              <a:t>give</a:t>
+            </a:r>
+            <a:r>
+              <a:rPr lang="en-US" baseline="0" dirty="0" smtClean="0"/>
+              <a:t> more details on how the web app will work.</a:t>
+            </a:r>
+            <a:endParaRPr lang="en-ZA" dirty="0"/>
+          </a:p>
+        </p:txBody>
+      </p:sp>
+    </p:spTree>
+    <p:extLst>
+      <p:ext uri="{BB962C8B-B14F-4D97-AF65-F5344CB8AC3E}">
+        <p14:creationId xmlns:p14="http://schemas.microsoft.com/office/powerpoint/2010/main" val="3999591121"/>
+      </p:ext>
+    </p:extLst>
+  </p:cSld>
+  <p:clrMapOvr>
+    <a:masterClrMapping/>
+  </p:clrMapOvr>
+</p:notes>
+</file>
+
+<file path=ppt/notesSlides/notesSlide2.xml><?xml version="1.0" encoding="utf-8"?>
+<p:notes xmlns:a="http://schemas.openxmlformats.org/drawingml/2006/main" xmlns:r="http://schemas.openxmlformats.org/officeDocument/2006/relationships" xmlns:p="http://schemas.openxmlformats.org/presentationml/2006/main">
+  <p:cSld>
+    <p:spTree>
+      <p:nvGrpSpPr>
+        <p:cNvPr id="1" name=""/>
+        <p:cNvGrpSpPr/>
+        <p:nvPr/>
+      </p:nvGrpSpPr>
+      <p:grpSpPr>
+        <a:xfrm>
+          <a:off x="0" y="0"/>
+          <a:ext cx="0" cy="0"/>
+          <a:chOff x="0" y="0"/>
+          <a:chExt cx="0" cy="0"/>
+        </a:xfrm>
+      </p:grpSpPr>
+      <p:sp>
+        <p:nvSpPr>
+          <p:cNvPr id="2" name="Slide Image Placeholder 1"/>
+          <p:cNvSpPr>
+            <a:spLocks noGrp="1" noRot="1" noChangeAspect="1"/>
+          </p:cNvSpPr>
+          <p:nvPr>
+            <p:ph type="sldImg"/>
+          </p:nvPr>
+        </p:nvSpPr>
+        <p:spPr>
+          <a:xfrm>
+            <a:off x="2809875" y="1714500"/>
+            <a:ext cx="5638800" cy="4629150"/>
+          </a:xfrm>
+          <a:prstGeom prst="rect">
+            <a:avLst/>
+          </a:prstGeom>
+          <a:noFill/>
+          <a:ln w="12700">
+            <a:solidFill>
+              <a:prstClr val="black"/>
+            </a:solidFill>
+          </a:ln>
+        </p:spPr>
+      </p:sp>
+      <p:sp>
+        <p:nvSpPr>
+          <p:cNvPr id="3" name="Notes Placeholder 2"/>
+          <p:cNvSpPr>
+            <a:spLocks noGrp="1"/>
+          </p:cNvSpPr>
+          <p:nvPr>
+            <p:ph type="body" idx="1"/>
+          </p:nvPr>
+        </p:nvSpPr>
+        <p:spPr>
+          <a:xfrm>
+            <a:off x="1125538" y="6600825"/>
+            <a:ext cx="9007475" cy="5400675"/>
+          </a:xfrm>
+          <a:prstGeom prst="rect">
+            <a:avLst/>
+          </a:prstGeom>
+        </p:spPr>
+        <p:txBody>
+          <a:bodyPr/>
+          <a:lstStyle/>
+          <a:p>
+            <a:r>
+              <a:rPr lang="en-US" dirty="0" smtClean="0"/>
+              <a:t>This will be our landing page and the user will be able to browse through. But in order for them to add or remove items to their Wish List and/or Cart and place orders, they will have to login. To login, the user will have to click the on the icon located on the right side at the top of the page.</a:t>
+            </a:r>
             <a:endParaRPr lang="en-ZA" dirty="0"/>
           </a:p>
         </p:txBody>
@@ -317,6 +454,195 @@
     <p:extLst>
       <p:ext uri="{BB962C8B-B14F-4D97-AF65-F5344CB8AC3E}">
         <p14:creationId xmlns:p14="http://schemas.microsoft.com/office/powerpoint/2010/main" val="2449709713"/>
+      </p:ext>
+    </p:extLst>
+  </p:cSld>
+  <p:clrMapOvr>
+    <a:masterClrMapping/>
+  </p:clrMapOvr>
+</p:notes>
+</file>
+
+<file path=ppt/notesSlides/notesSlide3.xml><?xml version="1.0" encoding="utf-8"?>
+<p:notes xmlns:a="http://schemas.openxmlformats.org/drawingml/2006/main" xmlns:r="http://schemas.openxmlformats.org/officeDocument/2006/relationships" xmlns:p="http://schemas.openxmlformats.org/presentationml/2006/main">
+  <p:cSld>
+    <p:spTree>
+      <p:nvGrpSpPr>
+        <p:cNvPr id="1" name=""/>
+        <p:cNvGrpSpPr/>
+        <p:nvPr/>
+      </p:nvGrpSpPr>
+      <p:grpSpPr>
+        <a:xfrm>
+          <a:off x="0" y="0"/>
+          <a:ext cx="0" cy="0"/>
+          <a:chOff x="0" y="0"/>
+          <a:chExt cx="0" cy="0"/>
+        </a:xfrm>
+      </p:grpSpPr>
+      <p:sp>
+        <p:nvSpPr>
+          <p:cNvPr id="2" name="Slide Image Placeholder 1"/>
+          <p:cNvSpPr>
+            <a:spLocks noGrp="1" noRot="1" noChangeAspect="1"/>
+          </p:cNvSpPr>
+          <p:nvPr>
+            <p:ph type="sldImg"/>
+          </p:nvPr>
+        </p:nvSpPr>
+        <p:spPr>
+          <a:xfrm>
+            <a:off x="2809875" y="1714500"/>
+            <a:ext cx="5638800" cy="4629150"/>
+          </a:xfrm>
+          <a:prstGeom prst="rect">
+            <a:avLst/>
+          </a:prstGeom>
+          <a:noFill/>
+          <a:ln w="12700">
+            <a:solidFill>
+              <a:prstClr val="black"/>
+            </a:solidFill>
+          </a:ln>
+        </p:spPr>
+      </p:sp>
+      <p:sp>
+        <p:nvSpPr>
+          <p:cNvPr id="3" name="Notes Placeholder 2"/>
+          <p:cNvSpPr>
+            <a:spLocks noGrp="1"/>
+          </p:cNvSpPr>
+          <p:nvPr>
+            <p:ph type="body" idx="1"/>
+          </p:nvPr>
+        </p:nvSpPr>
+        <p:spPr>
+          <a:xfrm>
+            <a:off x="1125538" y="6600825"/>
+            <a:ext cx="9007475" cy="5400675"/>
+          </a:xfrm>
+          <a:prstGeom prst="rect">
+            <a:avLst/>
+          </a:prstGeom>
+        </p:spPr>
+        <p:txBody>
+          <a:bodyPr/>
+          <a:lstStyle/>
+          <a:p>
+            <a:r>
+              <a:rPr lang="en-US" dirty="0" smtClean="0"/>
+              <a:t>Once the user has clicked the login icon on the Landing Page, this small Login Page will fade in, blur the background as shown in the picture a request the user to enter their login details. Once that's done, the user will be sent back to the landing page where they would now have access to the full functionalities of the site. If the user enters incorrect details, they will be requested to reenter their details again or use the option of the 'Forgot' password option below the login and cancel buttons.</a:t>
+            </a:r>
+            <a:r>
+              <a:rPr lang="en-US" baseline="0" dirty="0" smtClean="0"/>
+              <a:t> </a:t>
+            </a:r>
+            <a:r>
+              <a:rPr lang="en-US" dirty="0" smtClean="0"/>
+              <a:t>For new users, they will get the option to sign-up and be able to log in on the web app. Once they click the Sign-up link, a signup page similar to the login page will fade in as the login page fades out</a:t>
+            </a:r>
+            <a:r>
+              <a:rPr lang="en-US" dirty="0" smtClean="0"/>
+              <a:t>.</a:t>
+            </a:r>
+            <a:endParaRPr lang="en-ZA" dirty="0"/>
+          </a:p>
+        </p:txBody>
+      </p:sp>
+    </p:spTree>
+    <p:extLst>
+      <p:ext uri="{BB962C8B-B14F-4D97-AF65-F5344CB8AC3E}">
+        <p14:creationId xmlns:p14="http://schemas.microsoft.com/office/powerpoint/2010/main" val="1535026411"/>
+      </p:ext>
+    </p:extLst>
+  </p:cSld>
+  <p:clrMapOvr>
+    <a:masterClrMapping/>
+  </p:clrMapOvr>
+</p:notes>
+</file>
+
+<file path=ppt/notesSlides/notesSlide4.xml><?xml version="1.0" encoding="utf-8"?>
+<p:notes xmlns:a="http://schemas.openxmlformats.org/drawingml/2006/main" xmlns:r="http://schemas.openxmlformats.org/officeDocument/2006/relationships" xmlns:p="http://schemas.openxmlformats.org/presentationml/2006/main">
+  <p:cSld>
+    <p:spTree>
+      <p:nvGrpSpPr>
+        <p:cNvPr id="1" name=""/>
+        <p:cNvGrpSpPr/>
+        <p:nvPr/>
+      </p:nvGrpSpPr>
+      <p:grpSpPr>
+        <a:xfrm>
+          <a:off x="0" y="0"/>
+          <a:ext cx="0" cy="0"/>
+          <a:chOff x="0" y="0"/>
+          <a:chExt cx="0" cy="0"/>
+        </a:xfrm>
+      </p:grpSpPr>
+      <p:sp>
+        <p:nvSpPr>
+          <p:cNvPr id="2" name="Slide Image Placeholder 1"/>
+          <p:cNvSpPr>
+            <a:spLocks noGrp="1" noRot="1" noChangeAspect="1"/>
+          </p:cNvSpPr>
+          <p:nvPr>
+            <p:ph type="sldImg"/>
+          </p:nvPr>
+        </p:nvSpPr>
+        <p:spPr>
+          <a:xfrm>
+            <a:off x="2809875" y="1714500"/>
+            <a:ext cx="5638800" cy="4629150"/>
+          </a:xfrm>
+          <a:prstGeom prst="rect">
+            <a:avLst/>
+          </a:prstGeom>
+          <a:noFill/>
+          <a:ln w="12700">
+            <a:solidFill>
+              <a:prstClr val="black"/>
+            </a:solidFill>
+          </a:ln>
+        </p:spPr>
+      </p:sp>
+      <p:sp>
+        <p:nvSpPr>
+          <p:cNvPr id="3" name="Notes Placeholder 2"/>
+          <p:cNvSpPr>
+            <a:spLocks noGrp="1"/>
+          </p:cNvSpPr>
+          <p:nvPr>
+            <p:ph type="body" idx="1"/>
+          </p:nvPr>
+        </p:nvSpPr>
+        <p:spPr>
+          <a:xfrm>
+            <a:off x="1125538" y="6600825"/>
+            <a:ext cx="9007475" cy="5400675"/>
+          </a:xfrm>
+          <a:prstGeom prst="rect">
+            <a:avLst/>
+          </a:prstGeom>
+        </p:spPr>
+        <p:txBody>
+          <a:bodyPr/>
+          <a:lstStyle/>
+          <a:p>
+            <a:r>
+              <a:rPr lang="en-US" dirty="0" smtClean="0"/>
+              <a:t>For new users, they will get the option to sign-up and be able to log in on the web app from the Login Page. Once they click the Sign-up link, a sign-up page similar to the login page will fade in as the Login Page fading out</a:t>
+            </a:r>
+            <a:r>
+              <a:rPr lang="en-US" dirty="0" smtClean="0"/>
+              <a:t>.</a:t>
+            </a:r>
+          </a:p>
+        </p:txBody>
+      </p:sp>
+    </p:spTree>
+    <p:extLst>
+      <p:ext uri="{BB962C8B-B14F-4D97-AF65-F5344CB8AC3E}">
+        <p14:creationId xmlns:p14="http://schemas.microsoft.com/office/powerpoint/2010/main" val="2642162161"/>
       </p:ext>
     </p:extLst>
   </p:cSld>
@@ -6142,40 +6468,65 @@
           <a:chExt cx="0" cy="0"/>
         </a:xfrm>
       </p:grpSpPr>
-      <p:pic>
-        <p:nvPicPr>
-          <p:cNvPr id="2" name="Picture 1"/>
-          <p:cNvPicPr>
-            <a:picLocks noChangeAspect="1"/>
-          </p:cNvPicPr>
-          <p:nvPr/>
-        </p:nvPicPr>
-        <p:blipFill>
-          <a:blip r:embed="rId3">
-            <a:extLst>
-              <a:ext uri="{28A0092B-C50C-407E-A947-70E740481C1C}">
-                <a14:useLocalDpi xmlns:a14="http://schemas.microsoft.com/office/drawing/2010/main" val="0"/>
-              </a:ext>
-            </a:extLst>
-          </a:blip>
-          <a:stretch>
-            <a:fillRect/>
-          </a:stretch>
-        </p:blipFill>
-        <p:spPr>
-          <a:xfrm>
-            <a:off x="2275835" y="1842559"/>
-            <a:ext cx="9164329" cy="7573432"/>
-          </a:xfrm>
-          <a:prstGeom prst="rect">
-            <a:avLst/>
-          </a:prstGeom>
-        </p:spPr>
-      </p:pic>
+      <p:sp>
+        <p:nvSpPr>
+          <p:cNvPr id="2" name="Title 1"/>
+          <p:cNvSpPr>
+            <a:spLocks noGrp="1"/>
+          </p:cNvSpPr>
+          <p:nvPr>
+            <p:ph type="ctrTitle"/>
+          </p:nvPr>
+        </p:nvSpPr>
+        <p:spPr/>
+        <p:txBody>
+          <a:bodyPr/>
+          <a:lstStyle/>
+          <a:p>
+            <a:r>
+              <a:rPr lang="en-ZA" dirty="0" smtClean="0"/>
+              <a:t>UI/UX Picture P</a:t>
+            </a:r>
+            <a:endParaRPr lang="en-ZA" dirty="0"/>
+          </a:p>
+        </p:txBody>
+      </p:sp>
+      <p:sp>
+        <p:nvSpPr>
+          <p:cNvPr id="3" name="Subtitle 2"/>
+          <p:cNvSpPr>
+            <a:spLocks noGrp="1"/>
+          </p:cNvSpPr>
+          <p:nvPr>
+            <p:ph type="subTitle" idx="1"/>
+          </p:nvPr>
+        </p:nvSpPr>
+        <p:spPr/>
+        <p:txBody>
+          <a:bodyPr/>
+          <a:lstStyle/>
+          <a:p>
+            <a:r>
+              <a:rPr lang="en-ZA" dirty="0" smtClean="0"/>
+              <a:t>This presentation can also be viewed here:</a:t>
+            </a:r>
+          </a:p>
+          <a:p>
+            <a:r>
+              <a:rPr lang="en-ZA" sz="2400" dirty="0">
+                <a:solidFill>
+                  <a:srgbClr val="002060"/>
+                </a:solidFill>
+              </a:rPr>
+              <a:t>https://pitchdeck.hypermatic.com/slides/lemk0e8h67792?token=WjBaJGhWam9fQF9tblA=</a:t>
+            </a:r>
+          </a:p>
+        </p:txBody>
+      </p:sp>
     </p:spTree>
     <p:extLst>
       <p:ext uri="{BB962C8B-B14F-4D97-AF65-F5344CB8AC3E}">
-        <p14:creationId xmlns:p14="http://schemas.microsoft.com/office/powerpoint/2010/main" val="4061389422"/>
+        <p14:creationId xmlns:p14="http://schemas.microsoft.com/office/powerpoint/2010/main" val="2994105070"/>
       </p:ext>
     </p:extLst>
   </p:cSld>
@@ -6211,7 +6562,7 @@
           <p:nvPr/>
         </p:nvPicPr>
         <p:blipFill>
-          <a:blip r:embed="rId2">
+          <a:blip r:embed="rId3">
             <a:extLst>
               <a:ext uri="{28A0092B-C50C-407E-A947-70E740481C1C}">
                 <a14:useLocalDpi xmlns:a14="http://schemas.microsoft.com/office/drawing/2010/main" val="0"/>
@@ -6224,8 +6575,8 @@
         </p:blipFill>
         <p:spPr>
           <a:xfrm>
-            <a:off x="2294888" y="2314112"/>
-            <a:ext cx="9126224" cy="6630325"/>
+            <a:off x="2275835" y="1842559"/>
+            <a:ext cx="9164329" cy="7573432"/>
           </a:xfrm>
           <a:prstGeom prst="rect">
             <a:avLst/>
@@ -6235,7 +6586,7 @@
     </p:spTree>
     <p:extLst>
       <p:ext uri="{BB962C8B-B14F-4D97-AF65-F5344CB8AC3E}">
-        <p14:creationId xmlns:p14="http://schemas.microsoft.com/office/powerpoint/2010/main" val="4051386787"/>
+        <p14:creationId xmlns:p14="http://schemas.microsoft.com/office/powerpoint/2010/main" val="4061389422"/>
       </p:ext>
     </p:extLst>
   </p:cSld>
@@ -6271,7 +6622,7 @@
           <p:nvPr/>
         </p:nvPicPr>
         <p:blipFill>
-          <a:blip r:embed="rId2">
+          <a:blip r:embed="rId3">
             <a:extLst>
               <a:ext uri="{28A0092B-C50C-407E-A947-70E740481C1C}">
                 <a14:useLocalDpi xmlns:a14="http://schemas.microsoft.com/office/drawing/2010/main" val="0"/>
@@ -6284,8 +6635,8 @@
         </p:blipFill>
         <p:spPr>
           <a:xfrm>
-            <a:off x="2232967" y="2276007"/>
-            <a:ext cx="9250066" cy="6706536"/>
+            <a:off x="2294888" y="2314112"/>
+            <a:ext cx="9126224" cy="6630325"/>
           </a:xfrm>
           <a:prstGeom prst="rect">
             <a:avLst/>
@@ -6295,7 +6646,7 @@
     </p:spTree>
     <p:extLst>
       <p:ext uri="{BB962C8B-B14F-4D97-AF65-F5344CB8AC3E}">
-        <p14:creationId xmlns:p14="http://schemas.microsoft.com/office/powerpoint/2010/main" val="2609602766"/>
+        <p14:creationId xmlns:p14="http://schemas.microsoft.com/office/powerpoint/2010/main" val="4051386787"/>
       </p:ext>
     </p:extLst>
   </p:cSld>
@@ -6322,10 +6673,40 @@
           <a:chExt cx="0" cy="0"/>
         </a:xfrm>
       </p:grpSpPr>
+      <p:pic>
+        <p:nvPicPr>
+          <p:cNvPr id="2" name="Picture 1"/>
+          <p:cNvPicPr>
+            <a:picLocks noChangeAspect="1"/>
+          </p:cNvPicPr>
+          <p:nvPr/>
+        </p:nvPicPr>
+        <p:blipFill>
+          <a:blip r:embed="rId3">
+            <a:extLst>
+              <a:ext uri="{28A0092B-C50C-407E-A947-70E740481C1C}">
+                <a14:useLocalDpi xmlns:a14="http://schemas.microsoft.com/office/drawing/2010/main" val="0"/>
+              </a:ext>
+            </a:extLst>
+          </a:blip>
+          <a:stretch>
+            <a:fillRect/>
+          </a:stretch>
+        </p:blipFill>
+        <p:spPr>
+          <a:xfrm>
+            <a:off x="2232967" y="2276007"/>
+            <a:ext cx="9250066" cy="6706536"/>
+          </a:xfrm>
+          <a:prstGeom prst="rect">
+            <a:avLst/>
+          </a:prstGeom>
+        </p:spPr>
+      </p:pic>
     </p:spTree>
     <p:extLst>
       <p:ext uri="{BB962C8B-B14F-4D97-AF65-F5344CB8AC3E}">
-        <p14:creationId xmlns:p14="http://schemas.microsoft.com/office/powerpoint/2010/main" val="2794123361"/>
+        <p14:creationId xmlns:p14="http://schemas.microsoft.com/office/powerpoint/2010/main" val="2609602766"/>
       </p:ext>
     </p:extLst>
   </p:cSld>

</xml_diff>